<commit_message>
updating presentation for 2024-04-12
</commit_message>
<xml_diff>
--- a/Designing/Demonstrations and presentations for client/2024-04-12 Website demonstration.pptx
+++ b/Designing/Demonstrations and presentations for client/2024-04-12 Website demonstration.pptx
@@ -324,12 +324,12 @@
   <pc:docChgLst>
     <pc:chgData name="Sithija Wijesinghe" userId="34c3d59ba1d728d0" providerId="LiveId" clId="{914F1522-4FAE-4E8E-96E8-27617867096C}"/>
     <pc:docChg chg="undo custSel addSld delSld modSld">
-      <pc:chgData name="Sithija Wijesinghe" userId="34c3d59ba1d728d0" providerId="LiveId" clId="{914F1522-4FAE-4E8E-96E8-27617867096C}" dt="2024-04-12T00:34:42.180" v="1078" actId="20577"/>
+      <pc:chgData name="Sithija Wijesinghe" userId="34c3d59ba1d728d0" providerId="LiveId" clId="{914F1522-4FAE-4E8E-96E8-27617867096C}" dt="2024-04-12T16:56:55.275" v="1176" actId="20577"/>
       <pc:docMkLst>
         <pc:docMk/>
       </pc:docMkLst>
       <pc:sldChg chg="addSp delSp modSp mod">
-        <pc:chgData name="Sithija Wijesinghe" userId="34c3d59ba1d728d0" providerId="LiveId" clId="{914F1522-4FAE-4E8E-96E8-27617867096C}" dt="2024-04-12T00:29:52.129" v="1005" actId="20577"/>
+        <pc:chgData name="Sithija Wijesinghe" userId="34c3d59ba1d728d0" providerId="LiveId" clId="{914F1522-4FAE-4E8E-96E8-27617867096C}" dt="2024-04-12T16:53:07.349" v="1096"/>
         <pc:sldMkLst>
           <pc:docMk/>
           <pc:sldMk cId="0" sldId="257"/>
@@ -359,7 +359,7 @@
           </ac:spMkLst>
         </pc:spChg>
         <pc:spChg chg="mod">
-          <ac:chgData name="Sithija Wijesinghe" userId="34c3d59ba1d728d0" providerId="LiveId" clId="{914F1522-4FAE-4E8E-96E8-27617867096C}" dt="2024-04-11T23:57:08.951" v="761" actId="20577"/>
+          <ac:chgData name="Sithija Wijesinghe" userId="34c3d59ba1d728d0" providerId="LiveId" clId="{914F1522-4FAE-4E8E-96E8-27617867096C}" dt="2024-04-12T16:53:07.349" v="1096"/>
           <ac:spMkLst>
             <pc:docMk/>
             <pc:sldMk cId="0" sldId="257"/>
@@ -390,7 +390,7 @@
         </pc:sldMkLst>
       </pc:sldChg>
       <pc:sldChg chg="delSp modSp mod">
-        <pc:chgData name="Sithija Wijesinghe" userId="34c3d59ba1d728d0" providerId="LiveId" clId="{914F1522-4FAE-4E8E-96E8-27617867096C}" dt="2024-04-12T00:34:42.180" v="1078" actId="20577"/>
+        <pc:chgData name="Sithija Wijesinghe" userId="34c3d59ba1d728d0" providerId="LiveId" clId="{914F1522-4FAE-4E8E-96E8-27617867096C}" dt="2024-04-12T16:54:46.702" v="1143" actId="20577"/>
         <pc:sldMkLst>
           <pc:docMk/>
           <pc:sldMk cId="0" sldId="260"/>
@@ -404,7 +404,7 @@
           </ac:spMkLst>
         </pc:spChg>
         <pc:spChg chg="mod">
-          <ac:chgData name="Sithija Wijesinghe" userId="34c3d59ba1d728d0" providerId="LiveId" clId="{914F1522-4FAE-4E8E-96E8-27617867096C}" dt="2024-04-12T00:34:42.180" v="1078" actId="20577"/>
+          <ac:chgData name="Sithija Wijesinghe" userId="34c3d59ba1d728d0" providerId="LiveId" clId="{914F1522-4FAE-4E8E-96E8-27617867096C}" dt="2024-04-12T16:54:46.702" v="1143" actId="20577"/>
           <ac:spMkLst>
             <pc:docMk/>
             <pc:sldMk cId="0" sldId="260"/>
@@ -452,7 +452,7 @@
         </pc:spChg>
       </pc:sldChg>
       <pc:sldChg chg="modSp add mod">
-        <pc:chgData name="Sithija Wijesinghe" userId="34c3d59ba1d728d0" providerId="LiveId" clId="{914F1522-4FAE-4E8E-96E8-27617867096C}" dt="2024-04-12T00:24:59.474" v="901" actId="27636"/>
+        <pc:chgData name="Sithija Wijesinghe" userId="34c3d59ba1d728d0" providerId="LiveId" clId="{914F1522-4FAE-4E8E-96E8-27617867096C}" dt="2024-04-12T16:53:00.653" v="1094"/>
         <pc:sldMkLst>
           <pc:docMk/>
           <pc:sldMk cId="520947837" sldId="263"/>
@@ -474,7 +474,7 @@
           </ac:spMkLst>
         </pc:spChg>
         <pc:spChg chg="mod">
-          <ac:chgData name="Sithija Wijesinghe" userId="34c3d59ba1d728d0" providerId="LiveId" clId="{914F1522-4FAE-4E8E-96E8-27617867096C}" dt="2024-04-12T00:24:40.755" v="899" actId="114"/>
+          <ac:chgData name="Sithija Wijesinghe" userId="34c3d59ba1d728d0" providerId="LiveId" clId="{914F1522-4FAE-4E8E-96E8-27617867096C}" dt="2024-04-12T16:53:00.653" v="1094"/>
           <ac:spMkLst>
             <pc:docMk/>
             <pc:sldMk cId="520947837" sldId="263"/>
@@ -483,13 +483,13 @@
         </pc:spChg>
       </pc:sldChg>
       <pc:sldChg chg="delSp modSp add mod">
-        <pc:chgData name="Sithija Wijesinghe" userId="34c3d59ba1d728d0" providerId="LiveId" clId="{914F1522-4FAE-4E8E-96E8-27617867096C}" dt="2024-04-12T00:30:25.028" v="1071" actId="20577"/>
+        <pc:chgData name="Sithija Wijesinghe" userId="34c3d59ba1d728d0" providerId="LiveId" clId="{914F1522-4FAE-4E8E-96E8-27617867096C}" dt="2024-04-12T16:56:55.275" v="1176" actId="20577"/>
         <pc:sldMkLst>
           <pc:docMk/>
           <pc:sldMk cId="2311918446" sldId="264"/>
         </pc:sldMkLst>
         <pc:spChg chg="mod">
-          <ac:chgData name="Sithija Wijesinghe" userId="34c3d59ba1d728d0" providerId="LiveId" clId="{914F1522-4FAE-4E8E-96E8-27617867096C}" dt="2024-04-12T00:30:25.028" v="1071" actId="20577"/>
+          <ac:chgData name="Sithija Wijesinghe" userId="34c3d59ba1d728d0" providerId="LiveId" clId="{914F1522-4FAE-4E8E-96E8-27617867096C}" dt="2024-04-12T16:56:55.275" v="1176" actId="20577"/>
           <ac:spMkLst>
             <pc:docMk/>
             <pc:sldMk cId="2311918446" sldId="264"/>
@@ -7530,14 +7530,14 @@
             <a:pPr lvl="1"/>
             <a:r>
               <a:rPr lang="en-US" dirty="0"/>
-              <a:t>Geographical</a:t>
+              <a:t>Trends</a:t>
             </a:r>
           </a:p>
           <a:p>
             <a:pPr lvl="1"/>
             <a:r>
               <a:rPr lang="en-US" dirty="0"/>
-              <a:t>Trends</a:t>
+              <a:t>Geographical</a:t>
             </a:r>
           </a:p>
           <a:p>
@@ -7789,14 +7789,14 @@
             <a:pPr lvl="1"/>
             <a:r>
               <a:rPr lang="en-US" dirty="0"/>
-              <a:t>Geographical map</a:t>
+              <a:t>Trends graph</a:t>
             </a:r>
           </a:p>
           <a:p>
             <a:pPr lvl="1"/>
             <a:r>
               <a:rPr lang="en-US" dirty="0"/>
-              <a:t>Trends graph</a:t>
+              <a:t>Interactive geographical map</a:t>
             </a:r>
           </a:p>
           <a:p>
@@ -8047,10 +8047,30 @@
             </a:r>
           </a:p>
           <a:p>
+            <a:endParaRPr lang="en-US" dirty="0"/>
+          </a:p>
+          <a:p>
             <a:r>
               <a:rPr lang="en-US" dirty="0"/>
+              <a:t>Research papers</a:t>
+            </a:r>
+          </a:p>
+          <a:p>
+            <a:pPr lvl="1"/>
+            <a:r>
+              <a:rPr lang="en-US" dirty="0"/>
+              <a:t>Web scraping</a:t>
+            </a:r>
+          </a:p>
+          <a:p>
+            <a:endParaRPr lang="en-US"/>
+          </a:p>
+          <a:p>
+            <a:r>
+              <a:rPr lang="en-US"/>
               <a:t>Profile</a:t>
             </a:r>
+            <a:endParaRPr lang="en-US" dirty="0"/>
           </a:p>
           <a:p>
             <a:pPr lvl="1"/>
@@ -8281,7 +8301,42 @@
             </a:r>
           </a:p>
           <a:p>
+            <a:pPr marL="457200" lvl="0" indent="-342900" algn="l" rtl="0">
+              <a:spcBef>
+                <a:spcPts val="0"/>
+              </a:spcBef>
+              <a:spcAft>
+                <a:spcPts val="0"/>
+              </a:spcAft>
+              <a:buSzPts val="1800"/>
+              <a:buChar char="●"/>
+            </a:pPr>
             <a:endParaRPr lang="en-US" dirty="0"/>
+          </a:p>
+          <a:p>
+            <a:pPr marL="457200" lvl="0" indent="-342900" algn="l" rtl="0">
+              <a:spcBef>
+                <a:spcPts val="0"/>
+              </a:spcBef>
+              <a:spcAft>
+                <a:spcPts val="0"/>
+              </a:spcAft>
+              <a:buSzPts val="1800"/>
+              <a:buChar char="●"/>
+            </a:pPr>
+            <a:r>
+              <a:rPr lang="en-US" dirty="0"/>
+              <a:t>Search engine optimization (SEO)</a:t>
+            </a:r>
+          </a:p>
+          <a:p>
+            <a:endParaRPr lang="en-US" dirty="0"/>
+          </a:p>
+          <a:p>
+            <a:r>
+              <a:rPr lang="en-US" dirty="0"/>
+              <a:t>Animations</a:t>
+            </a:r>
           </a:p>
         </p:txBody>
       </p:sp>

</xml_diff>